<commit_message>
fixed case Study 4 ppt
</commit_message>
<xml_diff>
--- a/Case Study 4/Data Bank.pptx
+++ b/Case Study 4/Data Bank.pptx
@@ -5,7 +5,7 @@
     <p:sldMasterId id="2147483648" r:id="rId1"/>
   </p:sldMasterIdLst>
   <p:notesMasterIdLst>
-    <p:notesMasterId r:id="rId16"/>
+    <p:notesMasterId r:id="rId21"/>
   </p:notesMasterIdLst>
   <p:sldIdLst>
     <p:sldId id="257" r:id="rId2"/>
@@ -22,6 +22,11 @@
     <p:sldId id="268" r:id="rId13"/>
     <p:sldId id="269" r:id="rId14"/>
     <p:sldId id="271" r:id="rId15"/>
+    <p:sldId id="272" r:id="rId16"/>
+    <p:sldId id="273" r:id="rId17"/>
+    <p:sldId id="274" r:id="rId18"/>
+    <p:sldId id="275" r:id="rId19"/>
+    <p:sldId id="276" r:id="rId20"/>
   </p:sldIdLst>
   <p:sldSz cx="12192000" cy="6858000"/>
   <p:notesSz cx="6858000" cy="9144000"/>
@@ -210,7 +215,7 @@
           <a:p>
             <a:fld id="{4206A9EB-3595-490F-8EA7-7B50DCAC6C9D}" type="datetimeFigureOut">
               <a:rPr lang="en-IN" smtClean="0"/>
-              <a:t>17-04-2024</a:t>
+              <a:t>25-04-2024</a:t>
             </a:fld>
             <a:endParaRPr lang="en-IN"/>
           </a:p>
@@ -693,7 +698,7 @@
           <a:p>
             <a:fld id="{870BAC72-B78B-46DA-8088-F2F06230C291}" type="datetime1">
               <a:rPr lang="en-IN" smtClean="0"/>
-              <a:t>17-04-2024</a:t>
+              <a:t>25-04-2024</a:t>
             </a:fld>
             <a:endParaRPr lang="en-IN"/>
           </a:p>
@@ -867,7 +872,7 @@
           <a:p>
             <a:fld id="{40F7DEA9-5318-41A9-89D5-1A6C85C6BFEC}" type="datetime1">
               <a:rPr lang="en-IN" smtClean="0"/>
-              <a:t>17-04-2024</a:t>
+              <a:t>25-04-2024</a:t>
             </a:fld>
             <a:endParaRPr lang="en-IN"/>
           </a:p>
@@ -1051,7 +1056,7 @@
           <a:p>
             <a:fld id="{D6C063F9-A070-49F3-BB01-2CB470DCDC16}" type="datetime1">
               <a:rPr lang="en-IN" smtClean="0"/>
-              <a:t>17-04-2024</a:t>
+              <a:t>25-04-2024</a:t>
             </a:fld>
             <a:endParaRPr lang="en-IN"/>
           </a:p>
@@ -1225,7 +1230,7 @@
           <a:p>
             <a:fld id="{E93D08EA-7E22-4CDB-94D9-7710B174F581}" type="datetime1">
               <a:rPr lang="en-IN" smtClean="0"/>
-              <a:t>17-04-2024</a:t>
+              <a:t>25-04-2024</a:t>
             </a:fld>
             <a:endParaRPr lang="en-IN"/>
           </a:p>
@@ -1475,7 +1480,7 @@
           <a:p>
             <a:fld id="{E04C37EB-ACC7-496C-B71C-218183FA0B33}" type="datetime1">
               <a:rPr lang="en-IN" smtClean="0"/>
-              <a:t>17-04-2024</a:t>
+              <a:t>25-04-2024</a:t>
             </a:fld>
             <a:endParaRPr lang="en-IN"/>
           </a:p>
@@ -1711,7 +1716,7 @@
           <a:p>
             <a:fld id="{FAADCBE2-D463-4631-9039-2E439CF90496}" type="datetime1">
               <a:rPr lang="en-IN" smtClean="0"/>
-              <a:t>17-04-2024</a:t>
+              <a:t>25-04-2024</a:t>
             </a:fld>
             <a:endParaRPr lang="en-IN"/>
           </a:p>
@@ -2082,7 +2087,7 @@
           <a:p>
             <a:fld id="{F6EA6BDB-2745-4D6B-A0E9-F23F858F7721}" type="datetime1">
               <a:rPr lang="en-IN" smtClean="0"/>
-              <a:t>17-04-2024</a:t>
+              <a:t>25-04-2024</a:t>
             </a:fld>
             <a:endParaRPr lang="en-IN"/>
           </a:p>
@@ -2204,7 +2209,7 @@
           <a:p>
             <a:fld id="{E7FD43C1-0698-4CA1-8302-4E17A1B142CF}" type="datetime1">
               <a:rPr lang="en-IN" smtClean="0"/>
-              <a:t>17-04-2024</a:t>
+              <a:t>25-04-2024</a:t>
             </a:fld>
             <a:endParaRPr lang="en-IN"/>
           </a:p>
@@ -2303,7 +2308,7 @@
           <a:p>
             <a:fld id="{D5EE2D36-CBE2-4803-9DD0-8E81E01AD65E}" type="datetime1">
               <a:rPr lang="en-IN" smtClean="0"/>
-              <a:t>17-04-2024</a:t>
+              <a:t>25-04-2024</a:t>
             </a:fld>
             <a:endParaRPr lang="en-IN"/>
           </a:p>
@@ -2584,7 +2589,7 @@
           <a:p>
             <a:fld id="{3630E194-9C60-4129-B12C-F0FD100F084F}" type="datetime1">
               <a:rPr lang="en-IN" smtClean="0"/>
-              <a:t>17-04-2024</a:t>
+              <a:t>25-04-2024</a:t>
             </a:fld>
             <a:endParaRPr lang="en-IN"/>
           </a:p>
@@ -2841,7 +2846,7 @@
           <a:p>
             <a:fld id="{CF28CF72-C9FB-4014-88C4-8055B0E0AF20}" type="datetime1">
               <a:rPr lang="en-IN" smtClean="0"/>
-              <a:t>17-04-2024</a:t>
+              <a:t>25-04-2024</a:t>
             </a:fld>
             <a:endParaRPr lang="en-IN"/>
           </a:p>
@@ -3058,7 +3063,7 @@
           <a:p>
             <a:fld id="{45239E4D-C632-4245-9DDA-D62C66339B9A}" type="datetime1">
               <a:rPr lang="en-IN" smtClean="0"/>
-              <a:t>17-04-2024</a:t>
+              <a:t>25-04-2024</a:t>
             </a:fld>
             <a:endParaRPr lang="en-IN"/>
           </a:p>
@@ -3591,7 +3596,7 @@
           <a:p>
             <a:fld id="{80CC0000-6E62-4CC6-826E-F4A3F07FD82D}" type="datetime1">
               <a:rPr lang="en-IN" smtClean="0"/>
-              <a:t>17-04-2024</a:t>
+              <a:t>25-04-2024</a:t>
             </a:fld>
             <a:endParaRPr lang="en-IN"/>
           </a:p>
@@ -3784,7 +3789,7 @@
           <a:p>
             <a:fld id="{E93D08EA-7E22-4CDB-94D9-7710B174F581}" type="datetime1">
               <a:rPr lang="en-IN" smtClean="0"/>
-              <a:t>17-04-2024</a:t>
+              <a:t>25-04-2024</a:t>
             </a:fld>
             <a:endParaRPr lang="en-IN"/>
           </a:p>
@@ -3906,7 +3911,7 @@
           <a:p>
             <a:fld id="{E93D08EA-7E22-4CDB-94D9-7710B174F581}" type="datetime1">
               <a:rPr lang="en-IN" smtClean="0"/>
-              <a:t>17-04-2024</a:t>
+              <a:t>25-04-2024</a:t>
             </a:fld>
             <a:endParaRPr lang="en-IN"/>
           </a:p>
@@ -4086,7 +4091,7 @@
           <a:p>
             <a:fld id="{E93D08EA-7E22-4CDB-94D9-7710B174F581}" type="datetime1">
               <a:rPr lang="en-IN" smtClean="0"/>
-              <a:t>17-04-2024</a:t>
+              <a:t>25-04-2024</a:t>
             </a:fld>
             <a:endParaRPr lang="en-IN"/>
           </a:p>
@@ -4246,7 +4251,7 @@
         </p:blipFill>
         <p:spPr>
           <a:xfrm>
-            <a:off x="8153400" y="4158876"/>
+            <a:off x="8610062" y="3537938"/>
             <a:ext cx="2743738" cy="2197473"/>
           </a:xfrm>
         </p:spPr>
@@ -4268,7 +4273,7 @@
           <a:p>
             <a:fld id="{FAADCBE2-D463-4631-9039-2E439CF90496}" type="datetime1">
               <a:rPr lang="en-IN" smtClean="0"/>
-              <a:t>17-04-2024</a:t>
+              <a:t>25-04-2024</a:t>
             </a:fld>
             <a:endParaRPr lang="en-IN"/>
           </a:p>
@@ -4397,8 +4402,8 @@
         </p:blipFill>
         <p:spPr>
           <a:xfrm>
-            <a:off x="838200" y="2215290"/>
-            <a:ext cx="5668393" cy="3321545"/>
+            <a:off x="427607" y="2132163"/>
+            <a:ext cx="6078985" cy="3562142"/>
           </a:xfrm>
         </p:spPr>
       </p:pic>
@@ -4448,7 +4453,7 @@
           <a:p>
             <a:fld id="{FAADCBE2-D463-4631-9039-2E439CF90496}" type="datetime1">
               <a:rPr lang="en-IN" smtClean="0"/>
-              <a:t>17-04-2024</a:t>
+              <a:t>25-04-2024</a:t>
             </a:fld>
             <a:endParaRPr lang="en-IN"/>
           </a:p>
@@ -4504,6 +4509,995 @@
     <p:extLst>
       <p:ext uri="{BB962C8B-B14F-4D97-AF65-F5344CB8AC3E}">
         <p14:creationId xmlns:p14="http://schemas.microsoft.com/office/powerpoint/2010/main" val="3062714032"/>
+      </p:ext>
+    </p:extLst>
+  </p:cSld>
+  <p:clrMapOvr>
+    <a:masterClrMapping/>
+  </p:clrMapOvr>
+</p:sld>
+</file>
+
+<file path=ppt/slides/slide15.xml><?xml version="1.0" encoding="utf-8"?>
+<p:sld xmlns:a="http://schemas.openxmlformats.org/drawingml/2006/main" xmlns:r="http://schemas.openxmlformats.org/officeDocument/2006/relationships" xmlns:p="http://schemas.openxmlformats.org/presentationml/2006/main">
+  <p:cSld>
+    <p:spTree>
+      <p:nvGrpSpPr>
+        <p:cNvPr id="1" name=""/>
+        <p:cNvGrpSpPr/>
+        <p:nvPr/>
+      </p:nvGrpSpPr>
+      <p:grpSpPr>
+        <a:xfrm>
+          <a:off x="0" y="0"/>
+          <a:ext cx="0" cy="0"/>
+          <a:chOff x="0" y="0"/>
+          <a:chExt cx="0" cy="0"/>
+        </a:xfrm>
+      </p:grpSpPr>
+      <p:sp>
+        <p:nvSpPr>
+          <p:cNvPr id="2" name="Title 1"/>
+          <p:cNvSpPr>
+            <a:spLocks noGrp="1"/>
+          </p:cNvSpPr>
+          <p:nvPr>
+            <p:ph type="title"/>
+          </p:nvPr>
+        </p:nvSpPr>
+        <p:spPr>
+          <a:xfrm>
+            <a:off x="838200" y="365125"/>
+            <a:ext cx="10515600" cy="678583"/>
+          </a:xfrm>
+        </p:spPr>
+        <p:txBody>
+          <a:bodyPr>
+            <a:noAutofit/>
+          </a:bodyPr>
+          <a:lstStyle/>
+          <a:p>
+            <a:pPr fontAlgn="base"/>
+            <a:r>
+              <a:rPr lang="en-IN" b="1" dirty="0"/>
+              <a:t>C. Data Allocation Challenge</a:t>
+            </a:r>
+          </a:p>
+        </p:txBody>
+      </p:sp>
+      <p:sp>
+        <p:nvSpPr>
+          <p:cNvPr id="3" name="Content Placeholder 2"/>
+          <p:cNvSpPr>
+            <a:spLocks noGrp="1"/>
+          </p:cNvSpPr>
+          <p:nvPr>
+            <p:ph idx="1"/>
+          </p:nvPr>
+        </p:nvSpPr>
+        <p:spPr>
+          <a:xfrm>
+            <a:off x="838200" y="1043708"/>
+            <a:ext cx="10515600" cy="5458692"/>
+          </a:xfrm>
+        </p:spPr>
+        <p:txBody>
+          <a:bodyPr>
+            <a:normAutofit fontScale="92500" lnSpcReduction="10000"/>
+          </a:bodyPr>
+          <a:lstStyle/>
+          <a:p>
+            <a:pPr fontAlgn="base"/>
+            <a:r>
+              <a:rPr lang="en-US" dirty="0"/>
+              <a:t>To test out a few different hypotheses - the Data Bank team wants to run an experiment where different groups of customers would be allocated data using 3 different options:</a:t>
+            </a:r>
+          </a:p>
+          <a:p>
+            <a:pPr lvl="1" fontAlgn="base"/>
+            <a:r>
+              <a:rPr lang="en-US" dirty="0"/>
+              <a:t>Option 1: data is allocated based off the amount of money at the end of the previous month</a:t>
+            </a:r>
+          </a:p>
+          <a:p>
+            <a:pPr lvl="1" fontAlgn="base"/>
+            <a:r>
+              <a:rPr lang="en-US" dirty="0"/>
+              <a:t>Option 2: data is allocated on the average amount of money kept in the account in the previous 30 days</a:t>
+            </a:r>
+          </a:p>
+          <a:p>
+            <a:pPr lvl="1" fontAlgn="base"/>
+            <a:r>
+              <a:rPr lang="en-US" dirty="0"/>
+              <a:t>Option 3: data is updated real-time</a:t>
+            </a:r>
+          </a:p>
+          <a:p>
+            <a:pPr fontAlgn="base"/>
+            <a:r>
+              <a:rPr lang="en-US" dirty="0"/>
+              <a:t>For this multi-part challenge question - you have been requested to generate the following data elements to help the Data Bank team estimate how much data will need to be provisioned for each option:</a:t>
+            </a:r>
+          </a:p>
+          <a:p>
+            <a:pPr lvl="1" fontAlgn="base"/>
+            <a:r>
+              <a:rPr lang="en-US" dirty="0"/>
+              <a:t>running customer balance column that includes the impact each transaction</a:t>
+            </a:r>
+          </a:p>
+          <a:p>
+            <a:pPr lvl="1" fontAlgn="base"/>
+            <a:r>
+              <a:rPr lang="en-US" dirty="0"/>
+              <a:t>customer balance at the end of each month</a:t>
+            </a:r>
+          </a:p>
+          <a:p>
+            <a:pPr lvl="1" fontAlgn="base"/>
+            <a:r>
+              <a:rPr lang="en-US" dirty="0"/>
+              <a:t>minimum, average and maximum values of the running balance for each customer</a:t>
+            </a:r>
+          </a:p>
+          <a:p>
+            <a:pPr fontAlgn="base"/>
+            <a:r>
+              <a:rPr lang="en-US" dirty="0"/>
+              <a:t>Using all of the data available - how much data would have been required for each option on a monthly basis</a:t>
+            </a:r>
+            <a:r>
+              <a:rPr lang="en-US" dirty="0" smtClean="0"/>
+              <a:t>?</a:t>
+            </a:r>
+            <a:endParaRPr lang="en-US" dirty="0"/>
+          </a:p>
+        </p:txBody>
+      </p:sp>
+      <p:sp>
+        <p:nvSpPr>
+          <p:cNvPr id="4" name="Date Placeholder 3"/>
+          <p:cNvSpPr>
+            <a:spLocks noGrp="1"/>
+          </p:cNvSpPr>
+          <p:nvPr>
+            <p:ph type="dt" sz="half" idx="10"/>
+          </p:nvPr>
+        </p:nvSpPr>
+        <p:spPr/>
+        <p:txBody>
+          <a:bodyPr/>
+          <a:lstStyle/>
+          <a:p>
+            <a:fld id="{E93D08EA-7E22-4CDB-94D9-7710B174F581}" type="datetime1">
+              <a:rPr lang="en-IN" smtClean="0"/>
+              <a:t>25-04-2024</a:t>
+            </a:fld>
+            <a:endParaRPr lang="en-IN"/>
+          </a:p>
+        </p:txBody>
+      </p:sp>
+      <p:sp>
+        <p:nvSpPr>
+          <p:cNvPr id="5" name="Footer Placeholder 4"/>
+          <p:cNvSpPr>
+            <a:spLocks noGrp="1"/>
+          </p:cNvSpPr>
+          <p:nvPr>
+            <p:ph type="ftr" sz="quarter" idx="11"/>
+          </p:nvPr>
+        </p:nvSpPr>
+        <p:spPr/>
+        <p:txBody>
+          <a:bodyPr/>
+          <a:lstStyle/>
+          <a:p>
+            <a:r>
+              <a:rPr lang="en-US" smtClean="0"/>
+              <a:t>Case Study#4- Data Bank - Krishnan S</a:t>
+            </a:r>
+            <a:endParaRPr lang="en-IN"/>
+          </a:p>
+        </p:txBody>
+      </p:sp>
+      <p:sp>
+        <p:nvSpPr>
+          <p:cNvPr id="6" name="Slide Number Placeholder 5"/>
+          <p:cNvSpPr>
+            <a:spLocks noGrp="1"/>
+          </p:cNvSpPr>
+          <p:nvPr>
+            <p:ph type="sldNum" sz="quarter" idx="12"/>
+          </p:nvPr>
+        </p:nvSpPr>
+        <p:spPr/>
+        <p:txBody>
+          <a:bodyPr/>
+          <a:lstStyle/>
+          <a:p>
+            <a:fld id="{67F37C3A-1CBC-4D85-A96D-0551C3714D4F}" type="slidenum">
+              <a:rPr lang="en-IN" smtClean="0"/>
+              <a:t>15</a:t>
+            </a:fld>
+            <a:endParaRPr lang="en-IN"/>
+          </a:p>
+        </p:txBody>
+      </p:sp>
+    </p:spTree>
+    <p:extLst>
+      <p:ext uri="{BB962C8B-B14F-4D97-AF65-F5344CB8AC3E}">
+        <p14:creationId xmlns:p14="http://schemas.microsoft.com/office/powerpoint/2010/main" val="1299743378"/>
+      </p:ext>
+    </p:extLst>
+  </p:cSld>
+  <p:clrMapOvr>
+    <a:masterClrMapping/>
+  </p:clrMapOvr>
+</p:sld>
+</file>
+
+<file path=ppt/slides/slide16.xml><?xml version="1.0" encoding="utf-8"?>
+<p:sld xmlns:a="http://schemas.openxmlformats.org/drawingml/2006/main" xmlns:r="http://schemas.openxmlformats.org/officeDocument/2006/relationships" xmlns:p="http://schemas.openxmlformats.org/presentationml/2006/main">
+  <p:cSld>
+    <p:spTree>
+      <p:nvGrpSpPr>
+        <p:cNvPr id="1" name=""/>
+        <p:cNvGrpSpPr/>
+        <p:nvPr/>
+      </p:nvGrpSpPr>
+      <p:grpSpPr>
+        <a:xfrm>
+          <a:off x="0" y="0"/>
+          <a:ext cx="0" cy="0"/>
+          <a:chOff x="0" y="0"/>
+          <a:chExt cx="0" cy="0"/>
+        </a:xfrm>
+      </p:grpSpPr>
+      <p:sp>
+        <p:nvSpPr>
+          <p:cNvPr id="2" name="Title 1"/>
+          <p:cNvSpPr>
+            <a:spLocks noGrp="1"/>
+          </p:cNvSpPr>
+          <p:nvPr>
+            <p:ph type="title"/>
+          </p:nvPr>
+        </p:nvSpPr>
+        <p:spPr/>
+        <p:txBody>
+          <a:bodyPr/>
+          <a:lstStyle/>
+          <a:p>
+            <a:pPr marL="857250" indent="-857250">
+              <a:buFont typeface="+mj-lt"/>
+              <a:buAutoNum type="romanUcPeriod"/>
+            </a:pPr>
+            <a:r>
+              <a:rPr lang="en-US" dirty="0" smtClean="0"/>
+              <a:t>Running </a:t>
+            </a:r>
+            <a:r>
+              <a:rPr lang="en-US" dirty="0"/>
+              <a:t>customer balance column that includes the impact each transaction</a:t>
+            </a:r>
+            <a:endParaRPr lang="en-IN" dirty="0"/>
+          </a:p>
+        </p:txBody>
+      </p:sp>
+      <p:pic>
+        <p:nvPicPr>
+          <p:cNvPr id="9" name="Content Placeholder 8"/>
+          <p:cNvPicPr>
+            <a:picLocks noGrp="1" noChangeAspect="1"/>
+          </p:cNvPicPr>
+          <p:nvPr>
+            <p:ph sz="half" idx="2"/>
+          </p:nvPr>
+        </p:nvPicPr>
+        <p:blipFill>
+          <a:blip r:embed="rId2"/>
+          <a:stretch>
+            <a:fillRect/>
+          </a:stretch>
+        </p:blipFill>
+        <p:spPr>
+          <a:xfrm>
+            <a:off x="6096000" y="2564039"/>
+            <a:ext cx="5252049" cy="2145033"/>
+          </a:xfrm>
+          <a:prstGeom prst="rect">
+            <a:avLst/>
+          </a:prstGeom>
+        </p:spPr>
+      </p:pic>
+      <p:sp>
+        <p:nvSpPr>
+          <p:cNvPr id="5" name="Date Placeholder 4"/>
+          <p:cNvSpPr>
+            <a:spLocks noGrp="1"/>
+          </p:cNvSpPr>
+          <p:nvPr>
+            <p:ph type="dt" sz="half" idx="10"/>
+          </p:nvPr>
+        </p:nvSpPr>
+        <p:spPr/>
+        <p:txBody>
+          <a:bodyPr/>
+          <a:lstStyle/>
+          <a:p>
+            <a:fld id="{FAADCBE2-D463-4631-9039-2E439CF90496}" type="datetime1">
+              <a:rPr lang="en-IN" smtClean="0"/>
+              <a:t>25-04-2024</a:t>
+            </a:fld>
+            <a:endParaRPr lang="en-IN"/>
+          </a:p>
+        </p:txBody>
+      </p:sp>
+      <p:sp>
+        <p:nvSpPr>
+          <p:cNvPr id="6" name="Footer Placeholder 5"/>
+          <p:cNvSpPr>
+            <a:spLocks noGrp="1"/>
+          </p:cNvSpPr>
+          <p:nvPr>
+            <p:ph type="ftr" sz="quarter" idx="11"/>
+          </p:nvPr>
+        </p:nvSpPr>
+        <p:spPr/>
+        <p:txBody>
+          <a:bodyPr/>
+          <a:lstStyle/>
+          <a:p>
+            <a:r>
+              <a:rPr lang="en-US" smtClean="0"/>
+              <a:t>Case Study#4- Data Bank - Krishnan S</a:t>
+            </a:r>
+            <a:endParaRPr lang="en-IN"/>
+          </a:p>
+        </p:txBody>
+      </p:sp>
+      <p:sp>
+        <p:nvSpPr>
+          <p:cNvPr id="7" name="Slide Number Placeholder 6"/>
+          <p:cNvSpPr>
+            <a:spLocks noGrp="1"/>
+          </p:cNvSpPr>
+          <p:nvPr>
+            <p:ph type="sldNum" sz="quarter" idx="12"/>
+          </p:nvPr>
+        </p:nvSpPr>
+        <p:spPr/>
+        <p:txBody>
+          <a:bodyPr/>
+          <a:lstStyle/>
+          <a:p>
+            <a:fld id="{67F37C3A-1CBC-4D85-A96D-0551C3714D4F}" type="slidenum">
+              <a:rPr lang="en-IN" smtClean="0"/>
+              <a:t>16</a:t>
+            </a:fld>
+            <a:endParaRPr lang="en-IN"/>
+          </a:p>
+        </p:txBody>
+      </p:sp>
+      <p:pic>
+        <p:nvPicPr>
+          <p:cNvPr id="11" name="Content Placeholder 10"/>
+          <p:cNvPicPr>
+            <a:picLocks noGrp="1" noChangeAspect="1"/>
+          </p:cNvPicPr>
+          <p:nvPr>
+            <p:ph sz="half" idx="1"/>
+          </p:nvPr>
+        </p:nvPicPr>
+        <p:blipFill>
+          <a:blip r:embed="rId3"/>
+          <a:stretch>
+            <a:fillRect/>
+          </a:stretch>
+        </p:blipFill>
+        <p:spPr>
+          <a:xfrm>
+            <a:off x="838200" y="2320942"/>
+            <a:ext cx="5181600" cy="3046667"/>
+          </a:xfrm>
+          <a:prstGeom prst="rect">
+            <a:avLst/>
+          </a:prstGeom>
+        </p:spPr>
+      </p:pic>
+    </p:spTree>
+    <p:extLst>
+      <p:ext uri="{BB962C8B-B14F-4D97-AF65-F5344CB8AC3E}">
+        <p14:creationId xmlns:p14="http://schemas.microsoft.com/office/powerpoint/2010/main" val="3036091799"/>
+      </p:ext>
+    </p:extLst>
+  </p:cSld>
+  <p:clrMapOvr>
+    <a:masterClrMapping/>
+  </p:clrMapOvr>
+</p:sld>
+</file>
+
+<file path=ppt/slides/slide17.xml><?xml version="1.0" encoding="utf-8"?>
+<p:sld xmlns:a="http://schemas.openxmlformats.org/drawingml/2006/main" xmlns:r="http://schemas.openxmlformats.org/officeDocument/2006/relationships" xmlns:p="http://schemas.openxmlformats.org/presentationml/2006/main">
+  <p:cSld>
+    <p:spTree>
+      <p:nvGrpSpPr>
+        <p:cNvPr id="1" name=""/>
+        <p:cNvGrpSpPr/>
+        <p:nvPr/>
+      </p:nvGrpSpPr>
+      <p:grpSpPr>
+        <a:xfrm>
+          <a:off x="0" y="0"/>
+          <a:ext cx="0" cy="0"/>
+          <a:chOff x="0" y="0"/>
+          <a:chExt cx="0" cy="0"/>
+        </a:xfrm>
+      </p:grpSpPr>
+      <p:sp>
+        <p:nvSpPr>
+          <p:cNvPr id="2" name="Title 1"/>
+          <p:cNvSpPr>
+            <a:spLocks noGrp="1"/>
+          </p:cNvSpPr>
+          <p:nvPr>
+            <p:ph type="title"/>
+          </p:nvPr>
+        </p:nvSpPr>
+        <p:spPr/>
+        <p:txBody>
+          <a:bodyPr/>
+          <a:lstStyle/>
+          <a:p>
+            <a:pPr marL="857250" indent="-857250">
+              <a:buFont typeface="+mj-lt"/>
+              <a:buAutoNum type="romanUcPeriod" startAt="2"/>
+            </a:pPr>
+            <a:r>
+              <a:rPr lang="en-US" dirty="0" smtClean="0"/>
+              <a:t>Customer </a:t>
+            </a:r>
+            <a:r>
+              <a:rPr lang="en-US" dirty="0"/>
+              <a:t>balance at the end of each month</a:t>
+            </a:r>
+            <a:endParaRPr lang="en-IN" dirty="0"/>
+          </a:p>
+        </p:txBody>
+      </p:sp>
+      <p:pic>
+        <p:nvPicPr>
+          <p:cNvPr id="8" name="Content Placeholder 7"/>
+          <p:cNvPicPr>
+            <a:picLocks noGrp="1" noChangeAspect="1"/>
+          </p:cNvPicPr>
+          <p:nvPr>
+            <p:ph sz="half" idx="1"/>
+          </p:nvPr>
+        </p:nvPicPr>
+        <p:blipFill>
+          <a:blip r:embed="rId2"/>
+          <a:stretch>
+            <a:fillRect/>
+          </a:stretch>
+        </p:blipFill>
+        <p:spPr>
+          <a:xfrm>
+            <a:off x="838199" y="1825624"/>
+            <a:ext cx="5933798" cy="4176863"/>
+          </a:xfrm>
+          <a:prstGeom prst="rect">
+            <a:avLst/>
+          </a:prstGeom>
+        </p:spPr>
+      </p:pic>
+      <p:pic>
+        <p:nvPicPr>
+          <p:cNvPr id="9" name="Content Placeholder 8"/>
+          <p:cNvPicPr>
+            <a:picLocks noGrp="1" noChangeAspect="1"/>
+          </p:cNvPicPr>
+          <p:nvPr>
+            <p:ph sz="half" idx="2"/>
+          </p:nvPr>
+        </p:nvPicPr>
+        <p:blipFill>
+          <a:blip r:embed="rId3"/>
+          <a:stretch>
+            <a:fillRect/>
+          </a:stretch>
+        </p:blipFill>
+        <p:spPr>
+          <a:xfrm>
+            <a:off x="6771997" y="2281791"/>
+            <a:ext cx="4581804" cy="3957012"/>
+          </a:xfrm>
+          <a:prstGeom prst="rect">
+            <a:avLst/>
+          </a:prstGeom>
+        </p:spPr>
+      </p:pic>
+      <p:sp>
+        <p:nvSpPr>
+          <p:cNvPr id="5" name="Date Placeholder 4"/>
+          <p:cNvSpPr>
+            <a:spLocks noGrp="1"/>
+          </p:cNvSpPr>
+          <p:nvPr>
+            <p:ph type="dt" sz="half" idx="10"/>
+          </p:nvPr>
+        </p:nvSpPr>
+        <p:spPr/>
+        <p:txBody>
+          <a:bodyPr/>
+          <a:lstStyle/>
+          <a:p>
+            <a:fld id="{FAADCBE2-D463-4631-9039-2E439CF90496}" type="datetime1">
+              <a:rPr lang="en-IN" smtClean="0"/>
+              <a:t>25-04-2024</a:t>
+            </a:fld>
+            <a:endParaRPr lang="en-IN"/>
+          </a:p>
+        </p:txBody>
+      </p:sp>
+      <p:sp>
+        <p:nvSpPr>
+          <p:cNvPr id="6" name="Footer Placeholder 5"/>
+          <p:cNvSpPr>
+            <a:spLocks noGrp="1"/>
+          </p:cNvSpPr>
+          <p:nvPr>
+            <p:ph type="ftr" sz="quarter" idx="11"/>
+          </p:nvPr>
+        </p:nvSpPr>
+        <p:spPr/>
+        <p:txBody>
+          <a:bodyPr/>
+          <a:lstStyle/>
+          <a:p>
+            <a:r>
+              <a:rPr lang="en-US" smtClean="0"/>
+              <a:t>Case Study#4- Data Bank - Krishnan S</a:t>
+            </a:r>
+            <a:endParaRPr lang="en-IN"/>
+          </a:p>
+        </p:txBody>
+      </p:sp>
+      <p:sp>
+        <p:nvSpPr>
+          <p:cNvPr id="7" name="Slide Number Placeholder 6"/>
+          <p:cNvSpPr>
+            <a:spLocks noGrp="1"/>
+          </p:cNvSpPr>
+          <p:nvPr>
+            <p:ph type="sldNum" sz="quarter" idx="12"/>
+          </p:nvPr>
+        </p:nvSpPr>
+        <p:spPr/>
+        <p:txBody>
+          <a:bodyPr/>
+          <a:lstStyle/>
+          <a:p>
+            <a:fld id="{67F37C3A-1CBC-4D85-A96D-0551C3714D4F}" type="slidenum">
+              <a:rPr lang="en-IN" smtClean="0"/>
+              <a:t>17</a:t>
+            </a:fld>
+            <a:endParaRPr lang="en-IN"/>
+          </a:p>
+        </p:txBody>
+      </p:sp>
+    </p:spTree>
+    <p:extLst>
+      <p:ext uri="{BB962C8B-B14F-4D97-AF65-F5344CB8AC3E}">
+        <p14:creationId xmlns:p14="http://schemas.microsoft.com/office/powerpoint/2010/main" val="3320622959"/>
+      </p:ext>
+    </p:extLst>
+  </p:cSld>
+  <p:clrMapOvr>
+    <a:masterClrMapping/>
+  </p:clrMapOvr>
+</p:sld>
+</file>
+
+<file path=ppt/slides/slide18.xml><?xml version="1.0" encoding="utf-8"?>
+<p:sld xmlns:a="http://schemas.openxmlformats.org/drawingml/2006/main" xmlns:r="http://schemas.openxmlformats.org/officeDocument/2006/relationships" xmlns:p="http://schemas.openxmlformats.org/presentationml/2006/main">
+  <p:cSld>
+    <p:spTree>
+      <p:nvGrpSpPr>
+        <p:cNvPr id="1" name=""/>
+        <p:cNvGrpSpPr/>
+        <p:nvPr/>
+      </p:nvGrpSpPr>
+      <p:grpSpPr>
+        <a:xfrm>
+          <a:off x="0" y="0"/>
+          <a:ext cx="0" cy="0"/>
+          <a:chOff x="0" y="0"/>
+          <a:chExt cx="0" cy="0"/>
+        </a:xfrm>
+      </p:grpSpPr>
+      <p:sp>
+        <p:nvSpPr>
+          <p:cNvPr id="2" name="Title 1"/>
+          <p:cNvSpPr>
+            <a:spLocks noGrp="1"/>
+          </p:cNvSpPr>
+          <p:nvPr>
+            <p:ph type="title"/>
+          </p:nvPr>
+        </p:nvSpPr>
+        <p:spPr/>
+        <p:txBody>
+          <a:bodyPr>
+            <a:normAutofit/>
+          </a:bodyPr>
+          <a:lstStyle/>
+          <a:p>
+            <a:pPr marL="857250" indent="-857250">
+              <a:buFont typeface="+mj-lt"/>
+              <a:buAutoNum type="romanUcPeriod" startAt="3"/>
+            </a:pPr>
+            <a:r>
+              <a:rPr lang="en-US" dirty="0"/>
+              <a:t>M</a:t>
+            </a:r>
+            <a:r>
+              <a:rPr lang="en-US" dirty="0" smtClean="0"/>
+              <a:t>inimum</a:t>
+            </a:r>
+            <a:r>
+              <a:rPr lang="en-US" dirty="0"/>
+              <a:t>, average and maximum values of the running balance for each </a:t>
+            </a:r>
+            <a:r>
+              <a:rPr lang="en-US" dirty="0" smtClean="0"/>
+              <a:t>customer</a:t>
+            </a:r>
+            <a:endParaRPr lang="en-IN" dirty="0"/>
+          </a:p>
+        </p:txBody>
+      </p:sp>
+      <p:pic>
+        <p:nvPicPr>
+          <p:cNvPr id="8" name="Content Placeholder 7"/>
+          <p:cNvPicPr>
+            <a:picLocks noGrp="1" noChangeAspect="1"/>
+          </p:cNvPicPr>
+          <p:nvPr>
+            <p:ph sz="half" idx="1"/>
+          </p:nvPr>
+        </p:nvPicPr>
+        <p:blipFill>
+          <a:blip r:embed="rId2"/>
+          <a:stretch>
+            <a:fillRect/>
+          </a:stretch>
+        </p:blipFill>
+        <p:spPr>
+          <a:xfrm>
+            <a:off x="518425" y="2215468"/>
+            <a:ext cx="5829266" cy="3616102"/>
+          </a:xfrm>
+          <a:prstGeom prst="rect">
+            <a:avLst/>
+          </a:prstGeom>
+        </p:spPr>
+      </p:pic>
+      <p:pic>
+        <p:nvPicPr>
+          <p:cNvPr id="9" name="Content Placeholder 8"/>
+          <p:cNvPicPr>
+            <a:picLocks noGrp="1" noChangeAspect="1"/>
+          </p:cNvPicPr>
+          <p:nvPr>
+            <p:ph sz="half" idx="2"/>
+          </p:nvPr>
+        </p:nvPicPr>
+        <p:blipFill>
+          <a:blip r:embed="rId3"/>
+          <a:stretch>
+            <a:fillRect/>
+          </a:stretch>
+        </p:blipFill>
+        <p:spPr>
+          <a:xfrm>
+            <a:off x="6347691" y="2724688"/>
+            <a:ext cx="5181600" cy="3153628"/>
+          </a:xfrm>
+          <a:prstGeom prst="rect">
+            <a:avLst/>
+          </a:prstGeom>
+        </p:spPr>
+      </p:pic>
+      <p:sp>
+        <p:nvSpPr>
+          <p:cNvPr id="5" name="Date Placeholder 4"/>
+          <p:cNvSpPr>
+            <a:spLocks noGrp="1"/>
+          </p:cNvSpPr>
+          <p:nvPr>
+            <p:ph type="dt" sz="half" idx="10"/>
+          </p:nvPr>
+        </p:nvSpPr>
+        <p:spPr/>
+        <p:txBody>
+          <a:bodyPr/>
+          <a:lstStyle/>
+          <a:p>
+            <a:fld id="{FAADCBE2-D463-4631-9039-2E439CF90496}" type="datetime1">
+              <a:rPr lang="en-IN" smtClean="0"/>
+              <a:t>25-04-2024</a:t>
+            </a:fld>
+            <a:endParaRPr lang="en-IN"/>
+          </a:p>
+        </p:txBody>
+      </p:sp>
+      <p:sp>
+        <p:nvSpPr>
+          <p:cNvPr id="6" name="Footer Placeholder 5"/>
+          <p:cNvSpPr>
+            <a:spLocks noGrp="1"/>
+          </p:cNvSpPr>
+          <p:nvPr>
+            <p:ph type="ftr" sz="quarter" idx="11"/>
+          </p:nvPr>
+        </p:nvSpPr>
+        <p:spPr/>
+        <p:txBody>
+          <a:bodyPr/>
+          <a:lstStyle/>
+          <a:p>
+            <a:r>
+              <a:rPr lang="en-US" smtClean="0"/>
+              <a:t>Case Study#4- Data Bank - Krishnan S</a:t>
+            </a:r>
+            <a:endParaRPr lang="en-IN"/>
+          </a:p>
+        </p:txBody>
+      </p:sp>
+      <p:sp>
+        <p:nvSpPr>
+          <p:cNvPr id="7" name="Slide Number Placeholder 6"/>
+          <p:cNvSpPr>
+            <a:spLocks noGrp="1"/>
+          </p:cNvSpPr>
+          <p:nvPr>
+            <p:ph type="sldNum" sz="quarter" idx="12"/>
+          </p:nvPr>
+        </p:nvSpPr>
+        <p:spPr/>
+        <p:txBody>
+          <a:bodyPr/>
+          <a:lstStyle/>
+          <a:p>
+            <a:fld id="{67F37C3A-1CBC-4D85-A96D-0551C3714D4F}" type="slidenum">
+              <a:rPr lang="en-IN" smtClean="0"/>
+              <a:t>18</a:t>
+            </a:fld>
+            <a:endParaRPr lang="en-IN"/>
+          </a:p>
+        </p:txBody>
+      </p:sp>
+    </p:spTree>
+    <p:extLst>
+      <p:ext uri="{BB962C8B-B14F-4D97-AF65-F5344CB8AC3E}">
+        <p14:creationId xmlns:p14="http://schemas.microsoft.com/office/powerpoint/2010/main" val="1693226027"/>
+      </p:ext>
+    </p:extLst>
+  </p:cSld>
+  <p:clrMapOvr>
+    <a:masterClrMapping/>
+  </p:clrMapOvr>
+</p:sld>
+</file>
+
+<file path=ppt/slides/slide19.xml><?xml version="1.0" encoding="utf-8"?>
+<p:sld xmlns:a="http://schemas.openxmlformats.org/drawingml/2006/main" xmlns:r="http://schemas.openxmlformats.org/officeDocument/2006/relationships" xmlns:p="http://schemas.openxmlformats.org/presentationml/2006/main">
+  <p:cSld>
+    <p:spTree>
+      <p:nvGrpSpPr>
+        <p:cNvPr id="1" name=""/>
+        <p:cNvGrpSpPr/>
+        <p:nvPr/>
+      </p:nvGrpSpPr>
+      <p:grpSpPr>
+        <a:xfrm>
+          <a:off x="0" y="0"/>
+          <a:ext cx="0" cy="0"/>
+          <a:chOff x="0" y="0"/>
+          <a:chExt cx="0" cy="0"/>
+        </a:xfrm>
+      </p:grpSpPr>
+      <p:sp>
+        <p:nvSpPr>
+          <p:cNvPr id="2" name="Title 1"/>
+          <p:cNvSpPr>
+            <a:spLocks noGrp="1"/>
+          </p:cNvSpPr>
+          <p:nvPr>
+            <p:ph type="title"/>
+          </p:nvPr>
+        </p:nvSpPr>
+        <p:spPr>
+          <a:xfrm>
+            <a:off x="839788" y="365126"/>
+            <a:ext cx="10515600" cy="1092922"/>
+          </a:xfrm>
+        </p:spPr>
+        <p:txBody>
+          <a:bodyPr>
+            <a:normAutofit fontScale="90000"/>
+          </a:bodyPr>
+          <a:lstStyle/>
+          <a:p>
+            <a:r>
+              <a:rPr lang="en-US" b="1" dirty="0"/>
+              <a:t>Option 1: Data is allocated based off the amount of money at the end of the previous </a:t>
+            </a:r>
+            <a:r>
+              <a:rPr lang="en-US" b="1" dirty="0" smtClean="0"/>
+              <a:t>month</a:t>
+            </a:r>
+            <a:endParaRPr lang="en-IN" dirty="0"/>
+          </a:p>
+        </p:txBody>
+      </p:sp>
+      <p:sp>
+        <p:nvSpPr>
+          <p:cNvPr id="8" name="Text Placeholder 7"/>
+          <p:cNvSpPr>
+            <a:spLocks noGrp="1"/>
+          </p:cNvSpPr>
+          <p:nvPr>
+            <p:ph type="body" idx="1"/>
+          </p:nvPr>
+        </p:nvSpPr>
+        <p:spPr>
+          <a:xfrm>
+            <a:off x="838200" y="1458048"/>
+            <a:ext cx="10018063" cy="581746"/>
+          </a:xfrm>
+        </p:spPr>
+        <p:txBody>
+          <a:bodyPr/>
+          <a:lstStyle/>
+          <a:p>
+            <a:r>
+              <a:rPr lang="en-US" b="0" dirty="0"/>
+              <a:t>How much data would have been required on a monthly basis?</a:t>
+            </a:r>
+            <a:endParaRPr lang="en-IN" b="0" dirty="0"/>
+          </a:p>
+        </p:txBody>
+      </p:sp>
+      <p:pic>
+        <p:nvPicPr>
+          <p:cNvPr id="12" name="Content Placeholder 11"/>
+          <p:cNvPicPr>
+            <a:picLocks noGrp="1" noChangeAspect="1"/>
+          </p:cNvPicPr>
+          <p:nvPr>
+            <p:ph sz="half" idx="2"/>
+          </p:nvPr>
+        </p:nvPicPr>
+        <p:blipFill>
+          <a:blip r:embed="rId2"/>
+          <a:stretch>
+            <a:fillRect/>
+          </a:stretch>
+        </p:blipFill>
+        <p:spPr>
+          <a:xfrm>
+            <a:off x="838200" y="2039794"/>
+            <a:ext cx="6514185" cy="4316556"/>
+          </a:xfrm>
+          <a:prstGeom prst="rect">
+            <a:avLst/>
+          </a:prstGeom>
+        </p:spPr>
+      </p:pic>
+      <p:sp>
+        <p:nvSpPr>
+          <p:cNvPr id="5" name="Date Placeholder 4"/>
+          <p:cNvSpPr>
+            <a:spLocks noGrp="1"/>
+          </p:cNvSpPr>
+          <p:nvPr>
+            <p:ph type="dt" sz="half" idx="10"/>
+          </p:nvPr>
+        </p:nvSpPr>
+        <p:spPr/>
+        <p:txBody>
+          <a:bodyPr/>
+          <a:lstStyle/>
+          <a:p>
+            <a:fld id="{FAADCBE2-D463-4631-9039-2E439CF90496}" type="datetime1">
+              <a:rPr lang="en-IN" smtClean="0"/>
+              <a:t>25-04-2024</a:t>
+            </a:fld>
+            <a:endParaRPr lang="en-IN"/>
+          </a:p>
+        </p:txBody>
+      </p:sp>
+      <p:sp>
+        <p:nvSpPr>
+          <p:cNvPr id="6" name="Footer Placeholder 5"/>
+          <p:cNvSpPr>
+            <a:spLocks noGrp="1"/>
+          </p:cNvSpPr>
+          <p:nvPr>
+            <p:ph type="ftr" sz="quarter" idx="11"/>
+          </p:nvPr>
+        </p:nvSpPr>
+        <p:spPr/>
+        <p:txBody>
+          <a:bodyPr/>
+          <a:lstStyle/>
+          <a:p>
+            <a:r>
+              <a:rPr lang="en-US" smtClean="0"/>
+              <a:t>Case Study#4- Data Bank - Krishnan S</a:t>
+            </a:r>
+            <a:endParaRPr lang="en-IN"/>
+          </a:p>
+        </p:txBody>
+      </p:sp>
+      <p:sp>
+        <p:nvSpPr>
+          <p:cNvPr id="7" name="Slide Number Placeholder 6"/>
+          <p:cNvSpPr>
+            <a:spLocks noGrp="1"/>
+          </p:cNvSpPr>
+          <p:nvPr>
+            <p:ph type="sldNum" sz="quarter" idx="12"/>
+          </p:nvPr>
+        </p:nvSpPr>
+        <p:spPr/>
+        <p:txBody>
+          <a:bodyPr/>
+          <a:lstStyle/>
+          <a:p>
+            <a:fld id="{67F37C3A-1CBC-4D85-A96D-0551C3714D4F}" type="slidenum">
+              <a:rPr lang="en-IN" smtClean="0"/>
+              <a:t>19</a:t>
+            </a:fld>
+            <a:endParaRPr lang="en-IN"/>
+          </a:p>
+        </p:txBody>
+      </p:sp>
+      <p:pic>
+        <p:nvPicPr>
+          <p:cNvPr id="15" name="Content Placeholder 14"/>
+          <p:cNvPicPr>
+            <a:picLocks noGrp="1" noChangeAspect="1"/>
+          </p:cNvPicPr>
+          <p:nvPr>
+            <p:ph sz="quarter" idx="4"/>
+          </p:nvPr>
+        </p:nvPicPr>
+        <p:blipFill>
+          <a:blip r:embed="rId3"/>
+          <a:stretch>
+            <a:fillRect/>
+          </a:stretch>
+        </p:blipFill>
+        <p:spPr>
+          <a:xfrm>
+            <a:off x="7352385" y="4198072"/>
+            <a:ext cx="3918661" cy="2158278"/>
+          </a:xfrm>
+          <a:prstGeom prst="rect">
+            <a:avLst/>
+          </a:prstGeom>
+        </p:spPr>
+      </p:pic>
+    </p:spTree>
+    <p:extLst>
+      <p:ext uri="{BB962C8B-B14F-4D97-AF65-F5344CB8AC3E}">
+        <p14:creationId xmlns:p14="http://schemas.microsoft.com/office/powerpoint/2010/main" val="3608379176"/>
       </p:ext>
     </p:extLst>
   </p:cSld>
@@ -4575,8 +5569,8 @@
         </p:nvSpPr>
         <p:spPr>
           <a:xfrm>
-            <a:off x="838200" y="1579418"/>
-            <a:ext cx="10515600" cy="4776931"/>
+            <a:off x="838200" y="1403927"/>
+            <a:ext cx="10515600" cy="4721514"/>
           </a:xfrm>
         </p:spPr>
         <p:txBody>
@@ -4656,7 +5650,7 @@
           <a:p>
             <a:fld id="{E93D08EA-7E22-4CDB-94D9-7710B174F581}" type="datetime1">
               <a:rPr lang="en-IN" smtClean="0"/>
-              <a:t>17-04-2024</a:t>
+              <a:t>25-04-2024</a:t>
             </a:fld>
             <a:endParaRPr lang="en-IN"/>
           </a:p>
@@ -4810,7 +5804,7 @@
           <a:p>
             <a:fld id="{E93D08EA-7E22-4CDB-94D9-7710B174F581}" type="datetime1">
               <a:rPr lang="en-IN" smtClean="0"/>
-              <a:t>17-04-2024</a:t>
+              <a:t>25-04-2024</a:t>
             </a:fld>
             <a:endParaRPr lang="en-IN"/>
           </a:p>
@@ -5023,7 +6017,7 @@
           <a:p>
             <a:fld id="{E93D08EA-7E22-4CDB-94D9-7710B174F581}" type="datetime1">
               <a:rPr lang="en-IN" smtClean="0"/>
-              <a:t>17-04-2024</a:t>
+              <a:t>25-04-2024</a:t>
             </a:fld>
             <a:endParaRPr lang="en-IN"/>
           </a:p>
@@ -5175,7 +6169,7 @@
           <a:p>
             <a:fld id="{FAADCBE2-D463-4631-9039-2E439CF90496}" type="datetime1">
               <a:rPr lang="en-IN" smtClean="0"/>
-              <a:t>17-04-2024</a:t>
+              <a:t>25-04-2024</a:t>
             </a:fld>
             <a:endParaRPr lang="en-IN"/>
           </a:p>
@@ -5326,7 +6320,7 @@
           <a:p>
             <a:fld id="{E93D08EA-7E22-4CDB-94D9-7710B174F581}" type="datetime1">
               <a:rPr lang="en-IN" smtClean="0"/>
-              <a:t>17-04-2024</a:t>
+              <a:t>25-04-2024</a:t>
             </a:fld>
             <a:endParaRPr lang="en-IN"/>
           </a:p>
@@ -5506,7 +6500,7 @@
           <a:p>
             <a:fld id="{E93D08EA-7E22-4CDB-94D9-7710B174F581}" type="datetime1">
               <a:rPr lang="en-IN" smtClean="0"/>
-              <a:t>17-04-2024</a:t>
+              <a:t>25-04-2024</a:t>
             </a:fld>
             <a:endParaRPr lang="en-IN"/>
           </a:p>
@@ -5658,7 +6652,7 @@
           <a:p>
             <a:fld id="{FAADCBE2-D463-4631-9039-2E439CF90496}" type="datetime1">
               <a:rPr lang="en-IN" smtClean="0"/>
-              <a:t>17-04-2024</a:t>
+              <a:t>25-04-2024</a:t>
             </a:fld>
             <a:endParaRPr lang="en-IN"/>
           </a:p>
@@ -5869,7 +6863,7 @@
           <a:p>
             <a:fld id="{FAADCBE2-D463-4631-9039-2E439CF90496}" type="datetime1">
               <a:rPr lang="en-IN" smtClean="0"/>
-              <a:t>17-04-2024</a:t>
+              <a:t>25-04-2024</a:t>
             </a:fld>
             <a:endParaRPr lang="en-IN"/>
           </a:p>

</xml_diff>